<commit_message>
-Modified the IPEM presentation
</commit_message>
<xml_diff>
--- a/Presentation IPEM/Presentation IPEM.pptx
+++ b/Presentation IPEM/Presentation IPEM.pptx
@@ -5,10 +5,10 @@
     <p:sldMasterId id="2147483677" r:id="rId1"/>
   </p:sldMasterIdLst>
   <p:notesMasterIdLst>
-    <p:notesMasterId r:id="rId23"/>
+    <p:notesMasterId r:id="rId25"/>
   </p:notesMasterIdLst>
   <p:handoutMasterIdLst>
-    <p:handoutMasterId r:id="rId24"/>
+    <p:handoutMasterId r:id="rId26"/>
   </p:handoutMasterIdLst>
   <p:sldIdLst>
     <p:sldId id="257" r:id="rId2"/>
@@ -30,8 +30,10 @@
     <p:sldId id="275" r:id="rId18"/>
     <p:sldId id="277" r:id="rId19"/>
     <p:sldId id="278" r:id="rId20"/>
-    <p:sldId id="260" r:id="rId21"/>
-    <p:sldId id="263" r:id="rId22"/>
+    <p:sldId id="282" r:id="rId21"/>
+    <p:sldId id="260" r:id="rId22"/>
+    <p:sldId id="263" r:id="rId23"/>
+    <p:sldId id="281" r:id="rId24"/>
   </p:sldIdLst>
   <p:sldSz cx="9144000" cy="6858000" type="screen4x3"/>
   <p:notesSz cx="6858000" cy="9144000"/>
@@ -133,6 +135,9 @@
   <p:extLst>
     <p:ext uri="{EFAFB233-063F-42B5-8137-9DF3F51BA10A}">
       <p15:sldGuideLst xmlns:p15="http://schemas.microsoft.com/office/powerpoint/2012/main"/>
+    </p:ext>
+    <p:ext uri="{2D200454-40CA-4A62-9FC3-DE9A4176ACB9}">
+      <p15:notesGuideLst xmlns:p15="http://schemas.microsoft.com/office/powerpoint/2012/main"/>
     </p:ext>
   </p:extLst>
 </p:presentation>
@@ -1537,7 +1542,15 @@
           <a:bodyPr/>
           <a:lstStyle/>
           <a:p>
-            <a:endParaRPr lang="nl-BE"/>
+            <a:r>
+              <a:rPr lang="nl-BE" dirty="0" smtClean="0"/>
+              <a:t>Input</a:t>
+            </a:r>
+            <a:r>
+              <a:rPr lang="nl-BE" baseline="0" dirty="0" smtClean="0"/>
+              <a:t> van microfoon</a:t>
+            </a:r>
+            <a:endParaRPr lang="nl-BE" dirty="0"/>
           </a:p>
         </p:txBody>
       </p:sp>
@@ -1726,7 +1739,7 @@
           <a:p>
             <a:fld id="{F1B74BCE-2F86-4025-ABE5-8DEE86D7782F}" type="slidenum">
               <a:rPr lang="nl-BE" smtClean="0"/>
-              <a:t>20</a:t>
+              <a:t>21</a:t>
             </a:fld>
             <a:endParaRPr lang="nl-BE"/>
           </a:p>
@@ -1810,7 +1823,7 @@
           <a:p>
             <a:fld id="{F1B74BCE-2F86-4025-ABE5-8DEE86D7782F}" type="slidenum">
               <a:rPr lang="nl-BE" smtClean="0"/>
-              <a:t>21</a:t>
+              <a:t>22</a:t>
             </a:fld>
             <a:endParaRPr lang="nl-BE"/>
           </a:p>
@@ -1820,6 +1833,90 @@
     <p:extLst>
       <p:ext uri="{BB962C8B-B14F-4D97-AF65-F5344CB8AC3E}">
         <p14:creationId xmlns:p14="http://schemas.microsoft.com/office/powerpoint/2010/main" val="1019850739"/>
+      </p:ext>
+    </p:extLst>
+  </p:cSld>
+  <p:clrMapOvr>
+    <a:masterClrMapping/>
+  </p:clrMapOvr>
+</p:notes>
+</file>
+
+<file path=ppt/notesSlides/notesSlide22.xml><?xml version="1.0" encoding="utf-8"?>
+<p:notes xmlns:a="http://schemas.openxmlformats.org/drawingml/2006/main" xmlns:r="http://schemas.openxmlformats.org/officeDocument/2006/relationships" xmlns:p="http://schemas.openxmlformats.org/presentationml/2006/main">
+  <p:cSld>
+    <p:spTree>
+      <p:nvGrpSpPr>
+        <p:cNvPr id="1" name=""/>
+        <p:cNvGrpSpPr/>
+        <p:nvPr/>
+      </p:nvGrpSpPr>
+      <p:grpSpPr>
+        <a:xfrm>
+          <a:off x="0" y="0"/>
+          <a:ext cx="0" cy="0"/>
+          <a:chOff x="0" y="0"/>
+          <a:chExt cx="0" cy="0"/>
+        </a:xfrm>
+      </p:grpSpPr>
+      <p:sp>
+        <p:nvSpPr>
+          <p:cNvPr id="2" name="Slide Image Placeholder 1"/>
+          <p:cNvSpPr>
+            <a:spLocks noGrp="1" noRot="1" noChangeAspect="1"/>
+          </p:cNvSpPr>
+          <p:nvPr>
+            <p:ph type="sldImg"/>
+          </p:nvPr>
+        </p:nvSpPr>
+        <p:spPr/>
+      </p:sp>
+      <p:sp>
+        <p:nvSpPr>
+          <p:cNvPr id="3" name="Notes Placeholder 2"/>
+          <p:cNvSpPr>
+            <a:spLocks noGrp="1"/>
+          </p:cNvSpPr>
+          <p:nvPr>
+            <p:ph type="body" idx="1"/>
+          </p:nvPr>
+        </p:nvSpPr>
+        <p:spPr/>
+        <p:txBody>
+          <a:bodyPr/>
+          <a:lstStyle/>
+          <a:p>
+            <a:endParaRPr lang="nl-BE" dirty="0"/>
+          </a:p>
+        </p:txBody>
+      </p:sp>
+      <p:sp>
+        <p:nvSpPr>
+          <p:cNvPr id="4" name="Slide Number Placeholder 3"/>
+          <p:cNvSpPr>
+            <a:spLocks noGrp="1"/>
+          </p:cNvSpPr>
+          <p:nvPr>
+            <p:ph type="sldNum" sz="quarter" idx="10"/>
+          </p:nvPr>
+        </p:nvSpPr>
+        <p:spPr/>
+        <p:txBody>
+          <a:bodyPr/>
+          <a:lstStyle/>
+          <a:p>
+            <a:fld id="{F1B74BCE-2F86-4025-ABE5-8DEE86D7782F}" type="slidenum">
+              <a:rPr lang="nl-BE" smtClean="0"/>
+              <a:t>23</a:t>
+            </a:fld>
+            <a:endParaRPr lang="nl-BE"/>
+          </a:p>
+        </p:txBody>
+      </p:sp>
+    </p:spTree>
+    <p:extLst>
+      <p:ext uri="{BB962C8B-B14F-4D97-AF65-F5344CB8AC3E}">
+        <p14:creationId xmlns:p14="http://schemas.microsoft.com/office/powerpoint/2010/main" val="1776850095"/>
       </p:ext>
     </p:extLst>
   </p:cSld>
@@ -8766,7 +8863,11 @@
           <a:p>
             <a:r>
               <a:rPr lang="nl-BE" dirty="0" smtClean="0"/>
-              <a:t>What about SyncSink?</a:t>
+              <a:t>What about SyncSink</a:t>
+            </a:r>
+            <a:r>
+              <a:rPr lang="nl-BE" dirty="0"/>
+              <a:t>? [2] </a:t>
             </a:r>
             <a:endParaRPr lang="nl-BE" dirty="0"/>
           </a:p>
@@ -8791,14 +8892,26 @@
           <a:p>
             <a:r>
               <a:rPr lang="nl-BE" sz="2400" dirty="0" smtClean="0"/>
-              <a:t>SynkSink:</a:t>
+              <a:t>SyncSink</a:t>
+            </a:r>
+            <a:r>
+              <a:rPr lang="nl-BE" sz="2400" dirty="0" smtClean="0"/>
+              <a:t>:</a:t>
             </a:r>
           </a:p>
           <a:p>
             <a:pPr lvl="1"/>
             <a:r>
               <a:rPr lang="nl-BE" sz="2200" dirty="0" smtClean="0"/>
-              <a:t>Executed after the experiment</a:t>
+              <a:t>Executed </a:t>
+            </a:r>
+            <a:r>
+              <a:rPr lang="nl-BE" sz="2200" u="sng" dirty="0" smtClean="0"/>
+              <a:t>after</a:t>
+            </a:r>
+            <a:r>
+              <a:rPr lang="nl-BE" sz="2200" dirty="0" smtClean="0"/>
+              <a:t> the experiment</a:t>
             </a:r>
           </a:p>
           <a:p>
@@ -8818,11 +8931,7 @@
             <a:pPr lvl="1"/>
             <a:r>
               <a:rPr lang="nl-BE" sz="2200" dirty="0" smtClean="0"/>
-              <a:t>A more </a:t>
-            </a:r>
-            <a:r>
-              <a:rPr lang="nl-BE" sz="2200" dirty="0" smtClean="0"/>
-              <a:t>user-friendly system (like a Max/MSP module)</a:t>
+              <a:t>A more user-friendly system (like a Max/MSP module)</a:t>
             </a:r>
             <a:endParaRPr lang="nl-BE" sz="2200" dirty="0"/>
           </a:p>
@@ -8972,8 +9081,13 @@
           <a:p>
             <a:r>
               <a:rPr lang="nl-BE" sz="2400" dirty="0" smtClean="0"/>
-              <a:t>Acoustic fingerprinting</a:t>
-            </a:r>
+              <a:t>Acoustic </a:t>
+            </a:r>
+            <a:r>
+              <a:rPr lang="nl-BE" sz="2400" dirty="0" smtClean="0"/>
+              <a:t>fingerprinting [1]</a:t>
+            </a:r>
+            <a:endParaRPr lang="nl-BE" sz="2400" dirty="0" smtClean="0"/>
           </a:p>
           <a:p>
             <a:pPr lvl="1"/>
@@ -10034,7 +10148,11 @@
           <a:p>
             <a:r>
               <a:rPr lang="nl-BE" dirty="0" smtClean="0"/>
-              <a:t>Acoustic fingerprinting</a:t>
+              <a:t>Acoustic </a:t>
+            </a:r>
+            <a:r>
+              <a:rPr lang="nl-BE" dirty="0" smtClean="0"/>
+              <a:t>fingerprinting [1]</a:t>
             </a:r>
             <a:endParaRPr lang="nl-BE" dirty="0"/>
           </a:p>
@@ -10238,7 +10356,11 @@
           <a:p>
             <a:r>
               <a:rPr lang="nl-BE" dirty="0" smtClean="0"/>
-              <a:t>Another technique: crosscovariance</a:t>
+              <a:t>Another technique: </a:t>
+            </a:r>
+            <a:r>
+              <a:rPr lang="nl-BE" dirty="0" smtClean="0"/>
+              <a:t>cross-covariance [2]</a:t>
             </a:r>
             <a:endParaRPr lang="nl-BE" dirty="0"/>
           </a:p>
@@ -10268,7 +10390,11 @@
           <a:p>
             <a:r>
               <a:rPr lang="nl-BE" sz="2400" dirty="0" smtClean="0"/>
-              <a:t>Crosscovariance: degree of similarity between two signals</a:t>
+              <a:t>Cross-covariance</a:t>
+            </a:r>
+            <a:r>
+              <a:rPr lang="nl-BE" sz="2400" dirty="0" smtClean="0"/>
+              <a:t>: degree of similarity between two signals</a:t>
             </a:r>
           </a:p>
           <a:p>
@@ -10298,14 +10424,14 @@
           <a:p>
             <a:pPr lvl="1"/>
             <a:r>
-              <a:rPr lang="nl-BE" sz="2200" dirty="0" smtClean="0"/>
+              <a:rPr lang="nl-BE" sz="2200" b="1" u="sng" dirty="0" smtClean="0"/>
               <a:t>First acoustic fingerprinting</a:t>
             </a:r>
           </a:p>
           <a:p>
             <a:pPr lvl="1"/>
             <a:r>
-              <a:rPr lang="nl-BE" sz="2200" dirty="0" smtClean="0"/>
+              <a:rPr lang="nl-BE" sz="2200" b="1" u="sng" dirty="0" smtClean="0"/>
               <a:t>Refine result with this technique</a:t>
             </a:r>
           </a:p>
@@ -10868,7 +10994,7 @@
       </p:pic>
       <p:pic>
         <p:nvPicPr>
-          <p:cNvPr id="5" name="Picture 4"/>
+          <p:cNvPr id="3" name="Picture 2"/>
           <p:cNvPicPr>
             <a:picLocks noChangeAspect="1"/>
           </p:cNvPicPr>
@@ -10882,8 +11008,8 @@
         </p:blipFill>
         <p:spPr>
           <a:xfrm>
-            <a:off x="316300" y="1530020"/>
-            <a:ext cx="7926718" cy="4955842"/>
+            <a:off x="379750" y="1447864"/>
+            <a:ext cx="7014034" cy="4668203"/>
           </a:xfrm>
           <a:prstGeom prst="rect">
             <a:avLst/>
@@ -10969,24 +11095,14 @@
           <a:p>
             <a:r>
               <a:rPr lang="nl-BE" sz="2400" dirty="0" smtClean="0"/>
-              <a:t>2 </a:t>
-            </a:r>
+              <a:t>2 wave files</a:t>
+            </a:r>
+          </a:p>
+          <a:p>
             <a:r>
               <a:rPr lang="nl-BE" sz="2400" dirty="0" smtClean="0"/>
-              <a:t>wave files</a:t>
-            </a:r>
-            <a:endParaRPr lang="nl-BE" sz="2400" dirty="0" smtClean="0"/>
-          </a:p>
-          <a:p>
-            <a:r>
-              <a:rPr lang="nl-BE" sz="2400" dirty="0" smtClean="0"/>
-              <a:t>To each file: added </a:t>
-            </a:r>
-            <a:r>
-              <a:rPr lang="nl-BE" sz="2400" dirty="0" smtClean="0"/>
-              <a:t>several moments of silence</a:t>
-            </a:r>
-            <a:endParaRPr lang="nl-BE" sz="2400" dirty="0" smtClean="0"/>
+              <a:t>To each file: added several moments of silence</a:t>
+            </a:r>
           </a:p>
           <a:p>
             <a:r>
@@ -11152,61 +11268,30 @@
           <a:bodyPr/>
           <a:lstStyle/>
           <a:p>
+            <a:endParaRPr lang="nl-BE" dirty="0"/>
+          </a:p>
+        </p:txBody>
+      </p:sp>
+      <p:sp>
+        <p:nvSpPr>
+          <p:cNvPr id="3" name="Content Placeholder 2"/>
+          <p:cNvSpPr>
+            <a:spLocks noGrp="1"/>
+          </p:cNvSpPr>
+          <p:nvPr>
+            <p:ph idx="1"/>
+          </p:nvPr>
+        </p:nvSpPr>
+        <p:spPr/>
+        <p:txBody>
+          <a:bodyPr/>
+          <a:lstStyle/>
+          <a:p>
             <a:r>
               <a:rPr lang="nl-BE" dirty="0" smtClean="0"/>
-              <a:t>Future improvements</a:t>
+              <a:t>Soort van conclusie, herhalen van introductie, wat er precies allemaal gedaan is en wat het nut er van is.</a:t>
             </a:r>
             <a:endParaRPr lang="nl-BE" dirty="0"/>
-          </a:p>
-        </p:txBody>
-      </p:sp>
-      <p:sp>
-        <p:nvSpPr>
-          <p:cNvPr id="3" name="Content Placeholder 2"/>
-          <p:cNvSpPr>
-            <a:spLocks noGrp="1"/>
-          </p:cNvSpPr>
-          <p:nvPr>
-            <p:ph idx="1"/>
-          </p:nvPr>
-        </p:nvSpPr>
-        <p:spPr/>
-        <p:txBody>
-          <a:bodyPr>
-            <a:normAutofit/>
-          </a:bodyPr>
-          <a:lstStyle/>
-          <a:p>
-            <a:r>
-              <a:rPr lang="nl-BE" sz="2400" dirty="0" smtClean="0"/>
-              <a:t>Synchronization currently only possible with Max/MSP signals</a:t>
-            </a:r>
-          </a:p>
-          <a:p>
-            <a:r>
-              <a:rPr lang="nl-BE" sz="2400" dirty="0" smtClean="0"/>
-              <a:t>Impossible: synchronization of video or MIDI streams:</a:t>
-            </a:r>
-          </a:p>
-          <a:p>
-            <a:pPr lvl="1"/>
-            <a:r>
-              <a:rPr lang="nl-BE" sz="2200" dirty="0" smtClean="0"/>
-              <a:t>Should be </a:t>
-            </a:r>
-            <a:r>
-              <a:rPr lang="nl-BE" sz="2200" dirty="0" smtClean="0"/>
-              <a:t>converted to a Max/MSP </a:t>
-            </a:r>
-            <a:r>
-              <a:rPr lang="nl-BE" sz="2200" dirty="0" smtClean="0"/>
-              <a:t>signal</a:t>
-            </a:r>
-            <a:r>
-              <a:rPr lang="nl-BE" sz="2200" dirty="0" smtClean="0"/>
-              <a:t>.</a:t>
-            </a:r>
-            <a:endParaRPr lang="nl-BE" sz="2200" dirty="0"/>
           </a:p>
         </p:txBody>
       </p:sp>
@@ -11229,6 +11314,162 @@
               <a:rPr lang="nl-BE" smtClean="0"/>
               <a:pPr/>
               <a:t>20</a:t>
+            </a:fld>
+            <a:endParaRPr lang="nl-BE" dirty="0" smtClean="0"/>
+          </a:p>
+        </p:txBody>
+      </p:sp>
+      <p:pic>
+        <p:nvPicPr>
+          <p:cNvPr id="5" name="Picture 2" descr="http://www.renew.ugent.be/sites/default/files/LogoUGentWit.png"/>
+          <p:cNvPicPr>
+            <a:picLocks noChangeAspect="1" noChangeArrowheads="1"/>
+          </p:cNvPicPr>
+          <p:nvPr/>
+        </p:nvPicPr>
+        <p:blipFill>
+          <a:blip r:embed="rId2" cstate="print">
+            <a:extLst>
+              <a:ext uri="{28A0092B-C50C-407E-A947-70E740481C1C}">
+                <a14:useLocalDpi xmlns:a14="http://schemas.microsoft.com/office/drawing/2010/main" val="0"/>
+              </a:ext>
+            </a:extLst>
+          </a:blip>
+          <a:srcRect/>
+          <a:stretch>
+            <a:fillRect/>
+          </a:stretch>
+        </p:blipFill>
+        <p:spPr bwMode="auto">
+          <a:xfrm>
+            <a:off x="7623633" y="5668555"/>
+            <a:ext cx="1263564" cy="895025"/>
+          </a:xfrm>
+          <a:prstGeom prst="rect">
+            <a:avLst/>
+          </a:prstGeom>
+          <a:noFill/>
+          <a:extLst>
+            <a:ext uri="{909E8E84-426E-40DD-AFC4-6F175D3DCCD1}">
+              <a14:hiddenFill xmlns:a14="http://schemas.microsoft.com/office/drawing/2010/main">
+                <a:solidFill>
+                  <a:srgbClr val="FFFFFF"/>
+                </a:solidFill>
+              </a14:hiddenFill>
+            </a:ext>
+          </a:extLst>
+        </p:spPr>
+      </p:pic>
+    </p:spTree>
+    <p:extLst>
+      <p:ext uri="{BB962C8B-B14F-4D97-AF65-F5344CB8AC3E}">
+        <p14:creationId xmlns:p14="http://schemas.microsoft.com/office/powerpoint/2010/main" val="3654385166"/>
+      </p:ext>
+    </p:extLst>
+  </p:cSld>
+  <p:clrMapOvr>
+    <a:masterClrMapping/>
+  </p:clrMapOvr>
+</p:sld>
+</file>
+
+<file path=ppt/slides/slide21.xml><?xml version="1.0" encoding="utf-8"?>
+<p:sld xmlns:a="http://schemas.openxmlformats.org/drawingml/2006/main" xmlns:r="http://schemas.openxmlformats.org/officeDocument/2006/relationships" xmlns:p="http://schemas.openxmlformats.org/presentationml/2006/main">
+  <p:cSld>
+    <p:spTree>
+      <p:nvGrpSpPr>
+        <p:cNvPr id="1" name=""/>
+        <p:cNvGrpSpPr/>
+        <p:nvPr/>
+      </p:nvGrpSpPr>
+      <p:grpSpPr>
+        <a:xfrm>
+          <a:off x="0" y="0"/>
+          <a:ext cx="0" cy="0"/>
+          <a:chOff x="0" y="0"/>
+          <a:chExt cx="0" cy="0"/>
+        </a:xfrm>
+      </p:grpSpPr>
+      <p:sp>
+        <p:nvSpPr>
+          <p:cNvPr id="2" name="Title 1"/>
+          <p:cNvSpPr>
+            <a:spLocks noGrp="1"/>
+          </p:cNvSpPr>
+          <p:nvPr>
+            <p:ph type="title"/>
+          </p:nvPr>
+        </p:nvSpPr>
+        <p:spPr/>
+        <p:txBody>
+          <a:bodyPr/>
+          <a:lstStyle/>
+          <a:p>
+            <a:r>
+              <a:rPr lang="nl-BE" dirty="0" smtClean="0"/>
+              <a:t>Future improvements</a:t>
+            </a:r>
+            <a:endParaRPr lang="nl-BE" dirty="0"/>
+          </a:p>
+        </p:txBody>
+      </p:sp>
+      <p:sp>
+        <p:nvSpPr>
+          <p:cNvPr id="3" name="Content Placeholder 2"/>
+          <p:cNvSpPr>
+            <a:spLocks noGrp="1"/>
+          </p:cNvSpPr>
+          <p:nvPr>
+            <p:ph idx="1"/>
+          </p:nvPr>
+        </p:nvSpPr>
+        <p:spPr/>
+        <p:txBody>
+          <a:bodyPr>
+            <a:normAutofit/>
+          </a:bodyPr>
+          <a:lstStyle/>
+          <a:p>
+            <a:r>
+              <a:rPr lang="nl-BE" sz="2400" dirty="0" smtClean="0"/>
+              <a:t>Synchronization currently only possible with Max/MSP signals</a:t>
+            </a:r>
+          </a:p>
+          <a:p>
+            <a:r>
+              <a:rPr lang="nl-BE" sz="2400" dirty="0" smtClean="0"/>
+              <a:t>Impossible: synchronization of video or MIDI streams:</a:t>
+            </a:r>
+          </a:p>
+          <a:p>
+            <a:pPr lvl="1"/>
+            <a:r>
+              <a:rPr lang="nl-BE" sz="2200" dirty="0" smtClean="0"/>
+              <a:t>Should be converted to a Max/MSP signal.</a:t>
+            </a:r>
+            <a:endParaRPr lang="nl-BE" sz="2200" dirty="0"/>
+          </a:p>
+        </p:txBody>
+      </p:sp>
+      <p:sp>
+        <p:nvSpPr>
+          <p:cNvPr id="4" name="Slide Number Placeholder 3"/>
+          <p:cNvSpPr>
+            <a:spLocks noGrp="1"/>
+          </p:cNvSpPr>
+          <p:nvPr>
+            <p:ph type="sldNum" sz="quarter" idx="12"/>
+          </p:nvPr>
+        </p:nvSpPr>
+        <p:spPr/>
+        <p:txBody>
+          <a:bodyPr/>
+          <a:lstStyle/>
+          <a:p>
+            <a:fld id="{E8DE238E-16BA-439B-8635-94B95965949D}" type="slidenum">
+              <a:rPr lang="nl-BE" smtClean="0"/>
+              <a:pPr/>
+              <a:t>21</a:t>
             </a:fld>
             <a:endParaRPr lang="nl-BE" dirty="0" smtClean="0"/>
           </a:p>
@@ -11295,7 +11536,7 @@
 </p:sld>
 </file>
 
-<file path=ppt/slides/slide21.xml><?xml version="1.0" encoding="utf-8"?>
+<file path=ppt/slides/slide22.xml><?xml version="1.0" encoding="utf-8"?>
 <p:sld xmlns:a="http://schemas.openxmlformats.org/drawingml/2006/main" xmlns:r="http://schemas.openxmlformats.org/officeDocument/2006/relationships" xmlns:p="http://schemas.openxmlformats.org/presentationml/2006/main">
   <p:cSld>
     <p:spTree>
@@ -11330,7 +11571,7 @@
             <a:fld id="{E8DE238E-16BA-439B-8635-94B95965949D}" type="slidenum">
               <a:rPr lang="nl-BE" smtClean="0"/>
               <a:pPr/>
-              <a:t>21</a:t>
+              <a:t>22</a:t>
             </a:fld>
             <a:endParaRPr lang="nl-BE" dirty="0" smtClean="0"/>
           </a:p>
@@ -11441,6 +11682,272 @@
     <p:extLst>
       <p:ext uri="{BB962C8B-B14F-4D97-AF65-F5344CB8AC3E}">
         <p14:creationId xmlns:p14="http://schemas.microsoft.com/office/powerpoint/2010/main" val="3787292167"/>
+      </p:ext>
+    </p:extLst>
+  </p:cSld>
+  <p:clrMapOvr>
+    <a:masterClrMapping/>
+  </p:clrMapOvr>
+</p:sld>
+</file>
+
+<file path=ppt/slides/slide23.xml><?xml version="1.0" encoding="utf-8"?>
+<p:sld xmlns:a="http://schemas.openxmlformats.org/drawingml/2006/main" xmlns:r="http://schemas.openxmlformats.org/officeDocument/2006/relationships" xmlns:p="http://schemas.openxmlformats.org/presentationml/2006/main">
+  <p:cSld>
+    <p:spTree>
+      <p:nvGrpSpPr>
+        <p:cNvPr id="1" name=""/>
+        <p:cNvGrpSpPr/>
+        <p:nvPr/>
+      </p:nvGrpSpPr>
+      <p:grpSpPr>
+        <a:xfrm>
+          <a:off x="0" y="0"/>
+          <a:ext cx="0" cy="0"/>
+          <a:chOff x="0" y="0"/>
+          <a:chExt cx="0" cy="0"/>
+        </a:xfrm>
+      </p:grpSpPr>
+      <p:sp>
+        <p:nvSpPr>
+          <p:cNvPr id="2" name="Title 1"/>
+          <p:cNvSpPr>
+            <a:spLocks noGrp="1"/>
+          </p:cNvSpPr>
+          <p:nvPr>
+            <p:ph type="title"/>
+          </p:nvPr>
+        </p:nvSpPr>
+        <p:spPr/>
+        <p:txBody>
+          <a:bodyPr/>
+          <a:lstStyle/>
+          <a:p>
+            <a:r>
+              <a:rPr lang="nl-BE" dirty="0" smtClean="0"/>
+              <a:t>References</a:t>
+            </a:r>
+            <a:endParaRPr lang="nl-BE" dirty="0"/>
+          </a:p>
+        </p:txBody>
+      </p:sp>
+      <p:sp>
+        <p:nvSpPr>
+          <p:cNvPr id="3" name="Content Placeholder 2"/>
+          <p:cNvSpPr>
+            <a:spLocks noGrp="1"/>
+          </p:cNvSpPr>
+          <p:nvPr>
+            <p:ph idx="1"/>
+          </p:nvPr>
+        </p:nvSpPr>
+        <p:spPr/>
+        <p:txBody>
+          <a:bodyPr>
+            <a:normAutofit lnSpcReduction="10000"/>
+          </a:bodyPr>
+          <a:lstStyle/>
+          <a:p>
+            <a:r>
+              <a:rPr lang="en-US" dirty="0" smtClean="0"/>
+              <a:t>[1] Avery </a:t>
+            </a:r>
+            <a:r>
+              <a:rPr lang="en-US" dirty="0"/>
+              <a:t>L. Wang. An Industrial-Strength Audio Search Algorithm. </a:t>
+            </a:r>
+            <a:r>
+              <a:rPr lang="en-US" dirty="0" smtClean="0"/>
+              <a:t/>
+            </a:r>
+            <a:br>
+              <a:rPr lang="en-US" dirty="0" smtClean="0"/>
+            </a:br>
+            <a:r>
+              <a:rPr lang="en-US" i="1" dirty="0" smtClean="0">
+                <a:solidFill>
+                  <a:schemeClr val="tx1">
+                    <a:lumMod val="50000"/>
+                    <a:lumOff val="50000"/>
+                  </a:schemeClr>
+                </a:solidFill>
+              </a:rPr>
+              <a:t>In </a:t>
+            </a:r>
+            <a:r>
+              <a:rPr lang="en-US" i="1" dirty="0">
+                <a:solidFill>
+                  <a:schemeClr val="tx1">
+                    <a:lumMod val="50000"/>
+                    <a:lumOff val="50000"/>
+                  </a:schemeClr>
+                </a:solidFill>
+              </a:rPr>
+              <a:t>Proceedings of the 4th International Symposium on Music Information Retrieval (ISMIR 2003), pages 7–13, 2003</a:t>
+            </a:r>
+            <a:r>
+              <a:rPr lang="en-US" i="1" dirty="0" smtClean="0">
+                <a:solidFill>
+                  <a:schemeClr val="tx1">
+                    <a:lumMod val="50000"/>
+                    <a:lumOff val="50000"/>
+                  </a:schemeClr>
+                </a:solidFill>
+              </a:rPr>
+              <a:t>.</a:t>
+            </a:r>
+          </a:p>
+          <a:p>
+            <a:r>
+              <a:rPr lang="nl-BE" dirty="0" smtClean="0"/>
+              <a:t>[</a:t>
+            </a:r>
+            <a:r>
+              <a:rPr lang="nl-BE" dirty="0"/>
+              <a:t>2] Joren Six and Marc Leman. Synchronizing Multimodal Recordings Using </a:t>
+            </a:r>
+            <a:r>
+              <a:rPr lang="nl-BE" dirty="0" smtClean="0"/>
+              <a:t>Audio-To-Audio </a:t>
+            </a:r>
+            <a:r>
+              <a:rPr lang="nl-BE" dirty="0"/>
+              <a:t>Alignment. </a:t>
+            </a:r>
+            <a:r>
+              <a:rPr lang="nl-BE" dirty="0" smtClean="0"/>
+              <a:t/>
+            </a:r>
+            <a:br>
+              <a:rPr lang="nl-BE" dirty="0" smtClean="0"/>
+            </a:br>
+            <a:r>
+              <a:rPr lang="nl-BE" i="1" dirty="0" smtClean="0">
+                <a:solidFill>
+                  <a:schemeClr val="tx1">
+                    <a:lumMod val="50000"/>
+                    <a:lumOff val="50000"/>
+                  </a:schemeClr>
+                </a:solidFill>
+              </a:rPr>
+              <a:t>Journal </a:t>
+            </a:r>
+            <a:r>
+              <a:rPr lang="nl-BE" i="1" dirty="0">
+                <a:solidFill>
+                  <a:schemeClr val="tx1">
+                    <a:lumMod val="50000"/>
+                    <a:lumOff val="50000"/>
+                  </a:schemeClr>
+                </a:solidFill>
+              </a:rPr>
+              <a:t>of Multimodal User </a:t>
+            </a:r>
+            <a:r>
+              <a:rPr lang="nl-BE" i="1" dirty="0" smtClean="0">
+                <a:solidFill>
+                  <a:schemeClr val="tx1">
+                    <a:lumMod val="50000"/>
+                    <a:lumOff val="50000"/>
+                  </a:schemeClr>
+                </a:solidFill>
+              </a:rPr>
+              <a:t>Interfaces</a:t>
+            </a:r>
+          </a:p>
+          <a:p>
+            <a:r>
+              <a:rPr lang="en-US" dirty="0" smtClean="0"/>
+              <a:t>[3] </a:t>
+            </a:r>
+            <a:r>
+              <a:rPr lang="en-US" dirty="0" err="1" smtClean="0"/>
+              <a:t>Joren</a:t>
+            </a:r>
+            <a:r>
+              <a:rPr lang="en-US" dirty="0" smtClean="0"/>
+              <a:t> </a:t>
+            </a:r>
+            <a:r>
+              <a:rPr lang="en-US" dirty="0"/>
+              <a:t>Six and Marc Leman. </a:t>
+            </a:r>
+            <a:r>
+              <a:rPr lang="en-US" dirty="0" err="1"/>
+              <a:t>Panako</a:t>
+            </a:r>
+            <a:r>
+              <a:rPr lang="en-US" dirty="0"/>
+              <a:t> - A Scalable Acoustic Fingerprinting System Handling Time-Scale and Pitch Modification. </a:t>
+            </a:r>
+            <a:r>
+              <a:rPr lang="en-US" dirty="0" smtClean="0"/>
+              <a:t/>
+            </a:r>
+            <a:br>
+              <a:rPr lang="en-US" dirty="0" smtClean="0"/>
+            </a:br>
+            <a:r>
+              <a:rPr lang="en-US" i="1" dirty="0" smtClean="0">
+                <a:solidFill>
+                  <a:schemeClr val="tx1">
+                    <a:lumMod val="50000"/>
+                    <a:lumOff val="50000"/>
+                  </a:schemeClr>
+                </a:solidFill>
+              </a:rPr>
+              <a:t>In </a:t>
+            </a:r>
+            <a:r>
+              <a:rPr lang="en-US" i="1" dirty="0">
+                <a:solidFill>
+                  <a:schemeClr val="tx1">
+                    <a:lumMod val="50000"/>
+                    <a:lumOff val="50000"/>
+                  </a:schemeClr>
+                </a:solidFill>
+              </a:rPr>
+              <a:t>Proceedings of the 15th ISMIR Conference (ISMIR 2014), 2014.</a:t>
+            </a:r>
+            <a:endParaRPr lang="nl-BE" i="1" dirty="0">
+              <a:solidFill>
+                <a:schemeClr val="tx1">
+                  <a:lumMod val="50000"/>
+                  <a:lumOff val="50000"/>
+                </a:schemeClr>
+              </a:solidFill>
+            </a:endParaRPr>
+          </a:p>
+        </p:txBody>
+      </p:sp>
+      <p:sp>
+        <p:nvSpPr>
+          <p:cNvPr id="4" name="Slide Number Placeholder 3"/>
+          <p:cNvSpPr>
+            <a:spLocks noGrp="1"/>
+          </p:cNvSpPr>
+          <p:nvPr>
+            <p:ph type="sldNum" sz="quarter" idx="12"/>
+          </p:nvPr>
+        </p:nvSpPr>
+        <p:spPr/>
+        <p:txBody>
+          <a:bodyPr/>
+          <a:lstStyle/>
+          <a:p>
+            <a:fld id="{E8DE238E-16BA-439B-8635-94B95965949D}" type="slidenum">
+              <a:rPr lang="nl-BE" smtClean="0"/>
+              <a:pPr/>
+              <a:t>23</a:t>
+            </a:fld>
+            <a:endParaRPr lang="nl-BE" dirty="0" smtClean="0"/>
+          </a:p>
+        </p:txBody>
+      </p:sp>
+    </p:spTree>
+    <p:extLst>
+      <p:ext uri="{BB962C8B-B14F-4D97-AF65-F5344CB8AC3E}">
+        <p14:creationId xmlns:p14="http://schemas.microsoft.com/office/powerpoint/2010/main" val="1694903879"/>
       </p:ext>
     </p:extLst>
   </p:cSld>
@@ -13465,7 +13972,11 @@
           <a:p>
             <a:r>
               <a:rPr lang="nl-BE" dirty="0" smtClean="0"/>
-              <a:t>What about SyncSink?</a:t>
+              <a:t>What about </a:t>
+            </a:r>
+            <a:r>
+              <a:rPr lang="nl-BE" dirty="0" smtClean="0"/>
+              <a:t>SyncSink? [2] </a:t>
             </a:r>
             <a:endParaRPr lang="nl-BE" dirty="0"/>
           </a:p>

</xml_diff>